<commit_message>
end of course files
</commit_message>
<xml_diff>
--- a/day-4/slides/ppt/React Patterns and Practices.pptx
+++ b/day-4/slides/ppt/React Patterns and Practices.pptx
@@ -5,42 +5,41 @@
     <p:sldMasterId id="2147483668" r:id="rId1"/>
   </p:sldMasterIdLst>
   <p:notesMasterIdLst>
-    <p:notesMasterId r:id="rId18"/>
+    <p:notesMasterId r:id="rId17"/>
   </p:notesMasterIdLst>
   <p:sldIdLst>
     <p:sldId id="259" r:id="rId2"/>
     <p:sldId id="267" r:id="rId3"/>
     <p:sldId id="296" r:id="rId4"/>
     <p:sldId id="278" r:id="rId5"/>
-    <p:sldId id="305" r:id="rId6"/>
-    <p:sldId id="277" r:id="rId7"/>
-    <p:sldId id="310" r:id="rId8"/>
-    <p:sldId id="309" r:id="rId9"/>
-    <p:sldId id="290" r:id="rId10"/>
-    <p:sldId id="306" r:id="rId11"/>
-    <p:sldId id="311" r:id="rId12"/>
-    <p:sldId id="307" r:id="rId13"/>
-    <p:sldId id="313" r:id="rId14"/>
-    <p:sldId id="308" r:id="rId15"/>
-    <p:sldId id="312" r:id="rId16"/>
-    <p:sldId id="270" r:id="rId17"/>
+    <p:sldId id="277" r:id="rId6"/>
+    <p:sldId id="310" r:id="rId7"/>
+    <p:sldId id="309" r:id="rId8"/>
+    <p:sldId id="290" r:id="rId9"/>
+    <p:sldId id="306" r:id="rId10"/>
+    <p:sldId id="311" r:id="rId11"/>
+    <p:sldId id="307" r:id="rId12"/>
+    <p:sldId id="313" r:id="rId13"/>
+    <p:sldId id="308" r:id="rId14"/>
+    <p:sldId id="312" r:id="rId15"/>
+    <p:sldId id="270" r:id="rId16"/>
   </p:sldIdLst>
   <p:sldSz cx="9144000" cy="5143500" type="screen16x9"/>
   <p:notesSz cx="6858000" cy="9144000"/>
   <p:embeddedFontLst>
     <p:embeddedFont>
       <p:font typeface="Calibri" panose="020F0502020204030204" pitchFamily="34" charset="0"/>
-      <p:regular r:id="rId19"/>
-      <p:bold r:id="rId20"/>
-      <p:italic r:id="rId21"/>
-      <p:boldItalic r:id="rId22"/>
+      <p:regular r:id="rId18"/>
+      <p:bold r:id="rId19"/>
+      <p:italic r:id="rId20"/>
+      <p:boldItalic r:id="rId21"/>
     </p:embeddedFont>
     <p:embeddedFont>
-      <p:font typeface="Montserrat" pitchFamily="2" charset="77"/>
-      <p:regular r:id="rId23"/>
-      <p:bold r:id="rId24"/>
-      <p:italic r:id="rId25"/>
-      <p:boldItalic r:id="rId26"/>
+      <p:font typeface="Montserrat" panose="00000500000000000000" pitchFamily="2" charset="0"/>
+      <p:regular r:id="rId22"/>
+      <p:bold r:id="rId23"/>
+      <p:italic r:id="rId24"/>
+      <p:boldItalic r:id="rId25"/>
     </p:embeddedFont>
   </p:embeddedFontLst>
   <p:defaultTextStyle>
@@ -837,6 +836,72 @@
 </file>
 
 <file path=ppt/notesSlides/notesSlide10.xml><?xml version="1.0" encoding="utf-8"?>
+<p:notes xmlns:a="http://schemas.openxmlformats.org/drawingml/2006/main" xmlns:r="http://schemas.openxmlformats.org/officeDocument/2006/relationships" xmlns:p="http://schemas.openxmlformats.org/presentationml/2006/main">
+  <p:cSld>
+    <p:spTree>
+      <p:nvGrpSpPr>
+        <p:cNvPr id="1" name=""/>
+        <p:cNvGrpSpPr/>
+        <p:nvPr/>
+      </p:nvGrpSpPr>
+      <p:grpSpPr>
+        <a:xfrm>
+          <a:off x="0" y="0"/>
+          <a:ext cx="0" cy="0"/>
+          <a:chOff x="0" y="0"/>
+          <a:chExt cx="0" cy="0"/>
+        </a:xfrm>
+      </p:grpSpPr>
+      <p:sp>
+        <p:nvSpPr>
+          <p:cNvPr id="2" name="Slide Image Placeholder 1"/>
+          <p:cNvSpPr>
+            <a:spLocks noGrp="1" noRot="1" noChangeAspect="1"/>
+          </p:cNvSpPr>
+          <p:nvPr>
+            <p:ph type="sldImg"/>
+          </p:nvPr>
+        </p:nvSpPr>
+        <p:spPr>
+          <a:xfrm>
+            <a:off x="381000" y="685800"/>
+            <a:ext cx="6096000" cy="3429000"/>
+          </a:xfrm>
+        </p:spPr>
+      </p:sp>
+      <p:sp>
+        <p:nvSpPr>
+          <p:cNvPr id="3" name="Notes Placeholder 2"/>
+          <p:cNvSpPr>
+            <a:spLocks noGrp="1"/>
+          </p:cNvSpPr>
+          <p:nvPr>
+            <p:ph type="body" idx="1"/>
+          </p:nvPr>
+        </p:nvSpPr>
+        <p:spPr/>
+        <p:txBody>
+          <a:bodyPr/>
+          <a:lstStyle/>
+          <a:p>
+            <a:endParaRPr lang="en-US" dirty="0"/>
+          </a:p>
+        </p:txBody>
+      </p:sp>
+    </p:spTree>
+    <p:extLst>
+      <p:ext uri="{BB962C8B-B14F-4D97-AF65-F5344CB8AC3E}">
+        <p14:creationId xmlns:p14="http://schemas.microsoft.com/office/powerpoint/2010/main" val="2610747090"/>
+      </p:ext>
+    </p:extLst>
+  </p:cSld>
+  <p:clrMapOvr>
+    <a:masterClrMapping/>
+  </p:clrMapOvr>
+</p:notes>
+</file>
+
+<file path=ppt/notesSlides/notesSlide11.xml><?xml version="1.0" encoding="utf-8"?>
 <p:notes xmlns:a="http://schemas.openxmlformats.org/drawingml/2006/main" xmlns:r="http://schemas.openxmlformats.org/officeDocument/2006/relationships" xmlns:p="http://schemas.openxmlformats.org/presentationml/2006/main" showMasterSp="0" showMasterPhAnim="0">
   <p:cSld>
     <p:spTree>
@@ -935,7 +1000,7 @@
     </p:spTree>
     <p:extLst>
       <p:ext uri="{BB962C8B-B14F-4D97-AF65-F5344CB8AC3E}">
-        <p14:creationId xmlns:p14="http://schemas.microsoft.com/office/powerpoint/2010/main" val="2269277385"/>
+        <p14:creationId xmlns:p14="http://schemas.microsoft.com/office/powerpoint/2010/main" val="816426342"/>
       </p:ext>
     </p:extLst>
   </p:cSld>
@@ -945,7 +1010,7 @@
 </p:notes>
 </file>
 
-<file path=ppt/notesSlides/notesSlide11.xml><?xml version="1.0" encoding="utf-8"?>
+<file path=ppt/notesSlides/notesSlide12.xml><?xml version="1.0" encoding="utf-8"?>
 <p:notes xmlns:a="http://schemas.openxmlformats.org/drawingml/2006/main" xmlns:r="http://schemas.openxmlformats.org/officeDocument/2006/relationships" xmlns:p="http://schemas.openxmlformats.org/presentationml/2006/main">
   <p:cSld>
     <p:spTree>
@@ -994,6 +1059,9 @@
           <a:bodyPr/>
           <a:lstStyle/>
           <a:p>
+            <a:pPr marL="158750" indent="0" algn="l">
+              <a:buNone/>
+            </a:pPr>
             <a:endParaRPr lang="en-US" dirty="0"/>
           </a:p>
         </p:txBody>
@@ -1001,7 +1069,7 @@
     </p:spTree>
     <p:extLst>
       <p:ext uri="{BB962C8B-B14F-4D97-AF65-F5344CB8AC3E}">
-        <p14:creationId xmlns:p14="http://schemas.microsoft.com/office/powerpoint/2010/main" val="2610747090"/>
+        <p14:creationId xmlns:p14="http://schemas.microsoft.com/office/powerpoint/2010/main" val="3332222914"/>
       </p:ext>
     </p:extLst>
   </p:cSld>
@@ -1011,7 +1079,228 @@
 </p:notes>
 </file>
 
-<file path=ppt/notesSlides/notesSlide12.xml><?xml version="1.0" encoding="utf-8"?>
+<file path=ppt/notesSlides/notesSlide13.xml><?xml version="1.0" encoding="utf-8"?>
+<p:notes xmlns:a="http://schemas.openxmlformats.org/drawingml/2006/main" xmlns:r="http://schemas.openxmlformats.org/officeDocument/2006/relationships" xmlns:p="http://schemas.openxmlformats.org/presentationml/2006/main" showMasterSp="0" showMasterPhAnim="0">
+  <p:cSld>
+    <p:spTree>
+      <p:nvGrpSpPr>
+        <p:cNvPr id="1" name="Shape 275"/>
+        <p:cNvGrpSpPr/>
+        <p:nvPr/>
+      </p:nvGrpSpPr>
+      <p:grpSpPr>
+        <a:xfrm>
+          <a:off x="0" y="0"/>
+          <a:ext cx="0" cy="0"/>
+          <a:chOff x="0" y="0"/>
+          <a:chExt cx="0" cy="0"/>
+        </a:xfrm>
+      </p:grpSpPr>
+      <p:sp>
+        <p:nvSpPr>
+          <p:cNvPr id="276" name="Google Shape;276;g12176131a78_6_382:notes"/>
+          <p:cNvSpPr>
+            <a:spLocks noGrp="1" noRot="1" noChangeAspect="1"/>
+          </p:cNvSpPr>
+          <p:nvPr>
+            <p:ph type="sldImg" idx="2"/>
+          </p:nvPr>
+        </p:nvSpPr>
+        <p:spPr>
+          <a:xfrm>
+            <a:off x="381000" y="685800"/>
+            <a:ext cx="6096000" cy="3429000"/>
+          </a:xfrm>
+          <a:custGeom>
+            <a:avLst/>
+            <a:gdLst/>
+            <a:ahLst/>
+            <a:cxnLst/>
+            <a:rect l="l" t="t" r="r" b="b"/>
+            <a:pathLst>
+              <a:path w="120000" h="120000" extrusionOk="0">
+                <a:moveTo>
+                  <a:pt x="0" y="0"/>
+                </a:moveTo>
+                <a:lnTo>
+                  <a:pt x="120000" y="0"/>
+                </a:lnTo>
+                <a:lnTo>
+                  <a:pt x="120000" y="120000"/>
+                </a:lnTo>
+                <a:lnTo>
+                  <a:pt x="0" y="120000"/>
+                </a:lnTo>
+                <a:close/>
+              </a:path>
+            </a:pathLst>
+          </a:custGeom>
+        </p:spPr>
+      </p:sp>
+      <p:sp>
+        <p:nvSpPr>
+          <p:cNvPr id="277" name="Google Shape;277;g12176131a78_6_382:notes"/>
+          <p:cNvSpPr txBox="1">
+            <a:spLocks noGrp="1"/>
+          </p:cNvSpPr>
+          <p:nvPr>
+            <p:ph type="body" idx="1"/>
+          </p:nvPr>
+        </p:nvSpPr>
+        <p:spPr>
+          <a:xfrm>
+            <a:off x="685800" y="4343400"/>
+            <a:ext cx="5486400" cy="4114800"/>
+          </a:xfrm>
+          <a:prstGeom prst="rect">
+            <a:avLst/>
+          </a:prstGeom>
+        </p:spPr>
+        <p:txBody>
+          <a:bodyPr spcFirstLastPara="1" wrap="square" lIns="91425" tIns="91425" rIns="91425" bIns="91425" anchor="t" anchorCtr="0">
+            <a:noAutofit/>
+          </a:bodyPr>
+          <a:lstStyle/>
+          <a:p>
+            <a:pPr marL="0" lvl="0" indent="0" algn="l" rtl="0">
+              <a:spcBef>
+                <a:spcPts val="0"/>
+              </a:spcBef>
+              <a:spcAft>
+                <a:spcPts val="0"/>
+              </a:spcAft>
+              <a:buClr>
+                <a:schemeClr val="dk1"/>
+              </a:buClr>
+              <a:buSzPts val="1400"/>
+              <a:buFont typeface="Arial"/>
+              <a:buNone/>
+            </a:pPr>
+            <a:endParaRPr lang="en-US" dirty="0"/>
+          </a:p>
+        </p:txBody>
+      </p:sp>
+    </p:spTree>
+  </p:cSld>
+  <p:clrMapOvr>
+    <a:masterClrMapping/>
+  </p:clrMapOvr>
+</p:notes>
+</file>
+
+<file path=ppt/notesSlides/notesSlide2.xml><?xml version="1.0" encoding="utf-8"?>
+<p:notes xmlns:a="http://schemas.openxmlformats.org/drawingml/2006/main" xmlns:r="http://schemas.openxmlformats.org/officeDocument/2006/relationships" xmlns:p="http://schemas.openxmlformats.org/presentationml/2006/main" showMasterSp="0" showMasterPhAnim="0">
+  <p:cSld>
+    <p:spTree>
+      <p:nvGrpSpPr>
+        <p:cNvPr id="1" name="Shape 252"/>
+        <p:cNvGrpSpPr/>
+        <p:nvPr/>
+      </p:nvGrpSpPr>
+      <p:grpSpPr>
+        <a:xfrm>
+          <a:off x="0" y="0"/>
+          <a:ext cx="0" cy="0"/>
+          <a:chOff x="0" y="0"/>
+          <a:chExt cx="0" cy="0"/>
+        </a:xfrm>
+      </p:grpSpPr>
+      <p:sp>
+        <p:nvSpPr>
+          <p:cNvPr id="253" name="Google Shape;253;g12176131a78_6_362:notes"/>
+          <p:cNvSpPr txBox="1">
+            <a:spLocks noGrp="1"/>
+          </p:cNvSpPr>
+          <p:nvPr>
+            <p:ph type="body" idx="1"/>
+          </p:nvPr>
+        </p:nvSpPr>
+        <p:spPr>
+          <a:xfrm>
+            <a:off x="914400" y="4343400"/>
+            <a:ext cx="5029200" cy="4114800"/>
+          </a:xfrm>
+          <a:prstGeom prst="rect">
+            <a:avLst/>
+          </a:prstGeom>
+        </p:spPr>
+        <p:txBody>
+          <a:bodyPr spcFirstLastPara="1" wrap="square" lIns="91425" tIns="91425" rIns="91425" bIns="91425" anchor="t" anchorCtr="0">
+            <a:noAutofit/>
+          </a:bodyPr>
+          <a:lstStyle/>
+          <a:p>
+            <a:pPr marL="0" lvl="0" indent="0" algn="l" rtl="0">
+              <a:spcBef>
+                <a:spcPts val="0"/>
+              </a:spcBef>
+              <a:spcAft>
+                <a:spcPts val="0"/>
+              </a:spcAft>
+              <a:buNone/>
+            </a:pPr>
+            <a:endParaRPr lang="en-US" sz="1200" b="0" dirty="0">
+              <a:solidFill>
+                <a:schemeClr val="dk1"/>
+              </a:solidFill>
+              <a:latin typeface="Calibri"/>
+              <a:ea typeface="Calibri"/>
+              <a:cs typeface="Calibri"/>
+              <a:sym typeface="Calibri"/>
+            </a:endParaRPr>
+          </a:p>
+        </p:txBody>
+      </p:sp>
+      <p:sp>
+        <p:nvSpPr>
+          <p:cNvPr id="254" name="Google Shape;254;g12176131a78_6_362:notes"/>
+          <p:cNvSpPr>
+            <a:spLocks noGrp="1" noRot="1" noChangeAspect="1"/>
+          </p:cNvSpPr>
+          <p:nvPr>
+            <p:ph type="sldImg" idx="2"/>
+          </p:nvPr>
+        </p:nvSpPr>
+        <p:spPr>
+          <a:xfrm>
+            <a:off x="381000" y="685800"/>
+            <a:ext cx="6096000" cy="3429000"/>
+          </a:xfrm>
+          <a:custGeom>
+            <a:avLst/>
+            <a:gdLst/>
+            <a:ahLst/>
+            <a:cxnLst/>
+            <a:rect l="l" t="t" r="r" b="b"/>
+            <a:pathLst>
+              <a:path w="120000" h="120000" extrusionOk="0">
+                <a:moveTo>
+                  <a:pt x="0" y="0"/>
+                </a:moveTo>
+                <a:lnTo>
+                  <a:pt x="120000" y="0"/>
+                </a:lnTo>
+                <a:lnTo>
+                  <a:pt x="120000" y="120000"/>
+                </a:lnTo>
+                <a:lnTo>
+                  <a:pt x="0" y="120000"/>
+                </a:lnTo>
+                <a:close/>
+              </a:path>
+            </a:pathLst>
+          </a:custGeom>
+        </p:spPr>
+      </p:sp>
+    </p:spTree>
+  </p:cSld>
+  <p:clrMapOvr>
+    <a:masterClrMapping/>
+  </p:clrMapOvr>
+</p:notes>
+</file>
+
+<file path=ppt/notesSlides/notesSlide3.xml><?xml version="1.0" encoding="utf-8"?>
 <p:notes xmlns:a="http://schemas.openxmlformats.org/drawingml/2006/main" xmlns:r="http://schemas.openxmlformats.org/officeDocument/2006/relationships" xmlns:p="http://schemas.openxmlformats.org/presentationml/2006/main" showMasterSp="0" showMasterPhAnim="0">
   <p:cSld>
     <p:spTree>
@@ -1110,7 +1399,7 @@
     </p:spTree>
     <p:extLst>
       <p:ext uri="{BB962C8B-B14F-4D97-AF65-F5344CB8AC3E}">
-        <p14:creationId xmlns:p14="http://schemas.microsoft.com/office/powerpoint/2010/main" val="816426342"/>
+        <p14:creationId xmlns:p14="http://schemas.microsoft.com/office/powerpoint/2010/main" val="1293070"/>
       </p:ext>
     </p:extLst>
   </p:cSld>
@@ -1120,7 +1409,7 @@
 </p:notes>
 </file>
 
-<file path=ppt/notesSlides/notesSlide13.xml><?xml version="1.0" encoding="utf-8"?>
+<file path=ppt/notesSlides/notesSlide4.xml><?xml version="1.0" encoding="utf-8"?>
 <p:notes xmlns:a="http://schemas.openxmlformats.org/drawingml/2006/main" xmlns:r="http://schemas.openxmlformats.org/officeDocument/2006/relationships" xmlns:p="http://schemas.openxmlformats.org/presentationml/2006/main">
   <p:cSld>
     <p:spTree>
@@ -1179,7 +1468,7 @@
     </p:spTree>
     <p:extLst>
       <p:ext uri="{BB962C8B-B14F-4D97-AF65-F5344CB8AC3E}">
-        <p14:creationId xmlns:p14="http://schemas.microsoft.com/office/powerpoint/2010/main" val="3332222914"/>
+        <p14:creationId xmlns:p14="http://schemas.microsoft.com/office/powerpoint/2010/main" val="3113012134"/>
       </p:ext>
     </p:extLst>
   </p:cSld>
@@ -1189,342 +1478,7 @@
 </p:notes>
 </file>
 
-<file path=ppt/notesSlides/notesSlide14.xml><?xml version="1.0" encoding="utf-8"?>
-<p:notes xmlns:a="http://schemas.openxmlformats.org/drawingml/2006/main" xmlns:r="http://schemas.openxmlformats.org/officeDocument/2006/relationships" xmlns:p="http://schemas.openxmlformats.org/presentationml/2006/main" showMasterSp="0" showMasterPhAnim="0">
-  <p:cSld>
-    <p:spTree>
-      <p:nvGrpSpPr>
-        <p:cNvPr id="1" name="Shape 275"/>
-        <p:cNvGrpSpPr/>
-        <p:nvPr/>
-      </p:nvGrpSpPr>
-      <p:grpSpPr>
-        <a:xfrm>
-          <a:off x="0" y="0"/>
-          <a:ext cx="0" cy="0"/>
-          <a:chOff x="0" y="0"/>
-          <a:chExt cx="0" cy="0"/>
-        </a:xfrm>
-      </p:grpSpPr>
-      <p:sp>
-        <p:nvSpPr>
-          <p:cNvPr id="276" name="Google Shape;276;g12176131a78_6_382:notes"/>
-          <p:cNvSpPr>
-            <a:spLocks noGrp="1" noRot="1" noChangeAspect="1"/>
-          </p:cNvSpPr>
-          <p:nvPr>
-            <p:ph type="sldImg" idx="2"/>
-          </p:nvPr>
-        </p:nvSpPr>
-        <p:spPr>
-          <a:xfrm>
-            <a:off x="381000" y="685800"/>
-            <a:ext cx="6096000" cy="3429000"/>
-          </a:xfrm>
-          <a:custGeom>
-            <a:avLst/>
-            <a:gdLst/>
-            <a:ahLst/>
-            <a:cxnLst/>
-            <a:rect l="l" t="t" r="r" b="b"/>
-            <a:pathLst>
-              <a:path w="120000" h="120000" extrusionOk="0">
-                <a:moveTo>
-                  <a:pt x="0" y="0"/>
-                </a:moveTo>
-                <a:lnTo>
-                  <a:pt x="120000" y="0"/>
-                </a:lnTo>
-                <a:lnTo>
-                  <a:pt x="120000" y="120000"/>
-                </a:lnTo>
-                <a:lnTo>
-                  <a:pt x="0" y="120000"/>
-                </a:lnTo>
-                <a:close/>
-              </a:path>
-            </a:pathLst>
-          </a:custGeom>
-        </p:spPr>
-      </p:sp>
-      <p:sp>
-        <p:nvSpPr>
-          <p:cNvPr id="277" name="Google Shape;277;g12176131a78_6_382:notes"/>
-          <p:cNvSpPr txBox="1">
-            <a:spLocks noGrp="1"/>
-          </p:cNvSpPr>
-          <p:nvPr>
-            <p:ph type="body" idx="1"/>
-          </p:nvPr>
-        </p:nvSpPr>
-        <p:spPr>
-          <a:xfrm>
-            <a:off x="685800" y="4343400"/>
-            <a:ext cx="5486400" cy="4114800"/>
-          </a:xfrm>
-          <a:prstGeom prst="rect">
-            <a:avLst/>
-          </a:prstGeom>
-        </p:spPr>
-        <p:txBody>
-          <a:bodyPr spcFirstLastPara="1" wrap="square" lIns="91425" tIns="91425" rIns="91425" bIns="91425" anchor="t" anchorCtr="0">
-            <a:noAutofit/>
-          </a:bodyPr>
-          <a:lstStyle/>
-          <a:p>
-            <a:pPr marL="0" lvl="0" indent="0" algn="l" rtl="0">
-              <a:spcBef>
-                <a:spcPts val="0"/>
-              </a:spcBef>
-              <a:spcAft>
-                <a:spcPts val="0"/>
-              </a:spcAft>
-              <a:buClr>
-                <a:schemeClr val="dk1"/>
-              </a:buClr>
-              <a:buSzPts val="1400"/>
-              <a:buFont typeface="Arial"/>
-              <a:buNone/>
-            </a:pPr>
-            <a:endParaRPr lang="en-US" dirty="0"/>
-          </a:p>
-        </p:txBody>
-      </p:sp>
-    </p:spTree>
-  </p:cSld>
-  <p:clrMapOvr>
-    <a:masterClrMapping/>
-  </p:clrMapOvr>
-</p:notes>
-</file>
-
-<file path=ppt/notesSlides/notesSlide2.xml><?xml version="1.0" encoding="utf-8"?>
-<p:notes xmlns:a="http://schemas.openxmlformats.org/drawingml/2006/main" xmlns:r="http://schemas.openxmlformats.org/officeDocument/2006/relationships" xmlns:p="http://schemas.openxmlformats.org/presentationml/2006/main" showMasterSp="0" showMasterPhAnim="0">
-  <p:cSld>
-    <p:spTree>
-      <p:nvGrpSpPr>
-        <p:cNvPr id="1" name="Shape 252"/>
-        <p:cNvGrpSpPr/>
-        <p:nvPr/>
-      </p:nvGrpSpPr>
-      <p:grpSpPr>
-        <a:xfrm>
-          <a:off x="0" y="0"/>
-          <a:ext cx="0" cy="0"/>
-          <a:chOff x="0" y="0"/>
-          <a:chExt cx="0" cy="0"/>
-        </a:xfrm>
-      </p:grpSpPr>
-      <p:sp>
-        <p:nvSpPr>
-          <p:cNvPr id="253" name="Google Shape;253;g12176131a78_6_362:notes"/>
-          <p:cNvSpPr txBox="1">
-            <a:spLocks noGrp="1"/>
-          </p:cNvSpPr>
-          <p:nvPr>
-            <p:ph type="body" idx="1"/>
-          </p:nvPr>
-        </p:nvSpPr>
-        <p:spPr>
-          <a:xfrm>
-            <a:off x="914400" y="4343400"/>
-            <a:ext cx="5029200" cy="4114800"/>
-          </a:xfrm>
-          <a:prstGeom prst="rect">
-            <a:avLst/>
-          </a:prstGeom>
-        </p:spPr>
-        <p:txBody>
-          <a:bodyPr spcFirstLastPara="1" wrap="square" lIns="91425" tIns="91425" rIns="91425" bIns="91425" anchor="t" anchorCtr="0">
-            <a:noAutofit/>
-          </a:bodyPr>
-          <a:lstStyle/>
-          <a:p>
-            <a:pPr marL="0" lvl="0" indent="0" algn="l" rtl="0">
-              <a:spcBef>
-                <a:spcPts val="0"/>
-              </a:spcBef>
-              <a:spcAft>
-                <a:spcPts val="0"/>
-              </a:spcAft>
-              <a:buNone/>
-            </a:pPr>
-            <a:endParaRPr lang="en-US" sz="1200" b="0" dirty="0">
-              <a:solidFill>
-                <a:schemeClr val="dk1"/>
-              </a:solidFill>
-              <a:latin typeface="Calibri"/>
-              <a:ea typeface="Calibri"/>
-              <a:cs typeface="Calibri"/>
-              <a:sym typeface="Calibri"/>
-            </a:endParaRPr>
-          </a:p>
-        </p:txBody>
-      </p:sp>
-      <p:sp>
-        <p:nvSpPr>
-          <p:cNvPr id="254" name="Google Shape;254;g12176131a78_6_362:notes"/>
-          <p:cNvSpPr>
-            <a:spLocks noGrp="1" noRot="1" noChangeAspect="1"/>
-          </p:cNvSpPr>
-          <p:nvPr>
-            <p:ph type="sldImg" idx="2"/>
-          </p:nvPr>
-        </p:nvSpPr>
-        <p:spPr>
-          <a:xfrm>
-            <a:off x="381000" y="685800"/>
-            <a:ext cx="6096000" cy="3429000"/>
-          </a:xfrm>
-          <a:custGeom>
-            <a:avLst/>
-            <a:gdLst/>
-            <a:ahLst/>
-            <a:cxnLst/>
-            <a:rect l="l" t="t" r="r" b="b"/>
-            <a:pathLst>
-              <a:path w="120000" h="120000" extrusionOk="0">
-                <a:moveTo>
-                  <a:pt x="0" y="0"/>
-                </a:moveTo>
-                <a:lnTo>
-                  <a:pt x="120000" y="0"/>
-                </a:lnTo>
-                <a:lnTo>
-                  <a:pt x="120000" y="120000"/>
-                </a:lnTo>
-                <a:lnTo>
-                  <a:pt x="0" y="120000"/>
-                </a:lnTo>
-                <a:close/>
-              </a:path>
-            </a:pathLst>
-          </a:custGeom>
-        </p:spPr>
-      </p:sp>
-    </p:spTree>
-  </p:cSld>
-  <p:clrMapOvr>
-    <a:masterClrMapping/>
-  </p:clrMapOvr>
-</p:notes>
-</file>
-
-<file path=ppt/notesSlides/notesSlide3.xml><?xml version="1.0" encoding="utf-8"?>
-<p:notes xmlns:a="http://schemas.openxmlformats.org/drawingml/2006/main" xmlns:r="http://schemas.openxmlformats.org/officeDocument/2006/relationships" xmlns:p="http://schemas.openxmlformats.org/presentationml/2006/main" showMasterSp="0" showMasterPhAnim="0">
-  <p:cSld>
-    <p:spTree>
-      <p:nvGrpSpPr>
-        <p:cNvPr id="1" name="Shape 275"/>
-        <p:cNvGrpSpPr/>
-        <p:nvPr/>
-      </p:nvGrpSpPr>
-      <p:grpSpPr>
-        <a:xfrm>
-          <a:off x="0" y="0"/>
-          <a:ext cx="0" cy="0"/>
-          <a:chOff x="0" y="0"/>
-          <a:chExt cx="0" cy="0"/>
-        </a:xfrm>
-      </p:grpSpPr>
-      <p:sp>
-        <p:nvSpPr>
-          <p:cNvPr id="276" name="Google Shape;276;g12176131a78_6_382:notes"/>
-          <p:cNvSpPr>
-            <a:spLocks noGrp="1" noRot="1" noChangeAspect="1"/>
-          </p:cNvSpPr>
-          <p:nvPr>
-            <p:ph type="sldImg" idx="2"/>
-          </p:nvPr>
-        </p:nvSpPr>
-        <p:spPr>
-          <a:xfrm>
-            <a:off x="381000" y="685800"/>
-            <a:ext cx="6096000" cy="3429000"/>
-          </a:xfrm>
-          <a:custGeom>
-            <a:avLst/>
-            <a:gdLst/>
-            <a:ahLst/>
-            <a:cxnLst/>
-            <a:rect l="l" t="t" r="r" b="b"/>
-            <a:pathLst>
-              <a:path w="120000" h="120000" extrusionOk="0">
-                <a:moveTo>
-                  <a:pt x="0" y="0"/>
-                </a:moveTo>
-                <a:lnTo>
-                  <a:pt x="120000" y="0"/>
-                </a:lnTo>
-                <a:lnTo>
-                  <a:pt x="120000" y="120000"/>
-                </a:lnTo>
-                <a:lnTo>
-                  <a:pt x="0" y="120000"/>
-                </a:lnTo>
-                <a:close/>
-              </a:path>
-            </a:pathLst>
-          </a:custGeom>
-        </p:spPr>
-      </p:sp>
-      <p:sp>
-        <p:nvSpPr>
-          <p:cNvPr id="277" name="Google Shape;277;g12176131a78_6_382:notes"/>
-          <p:cNvSpPr txBox="1">
-            <a:spLocks noGrp="1"/>
-          </p:cNvSpPr>
-          <p:nvPr>
-            <p:ph type="body" idx="1"/>
-          </p:nvPr>
-        </p:nvSpPr>
-        <p:spPr>
-          <a:xfrm>
-            <a:off x="685800" y="4343400"/>
-            <a:ext cx="5486400" cy="4114800"/>
-          </a:xfrm>
-          <a:prstGeom prst="rect">
-            <a:avLst/>
-          </a:prstGeom>
-        </p:spPr>
-        <p:txBody>
-          <a:bodyPr spcFirstLastPara="1" wrap="square" lIns="91425" tIns="91425" rIns="91425" bIns="91425" anchor="t" anchorCtr="0">
-            <a:noAutofit/>
-          </a:bodyPr>
-          <a:lstStyle/>
-          <a:p>
-            <a:pPr marL="0" lvl="0" indent="0" algn="l" rtl="0">
-              <a:spcBef>
-                <a:spcPts val="0"/>
-              </a:spcBef>
-              <a:spcAft>
-                <a:spcPts val="0"/>
-              </a:spcAft>
-              <a:buClr>
-                <a:schemeClr val="dk1"/>
-              </a:buClr>
-              <a:buSzPts val="1400"/>
-              <a:buFont typeface="Arial"/>
-              <a:buNone/>
-            </a:pPr>
-            <a:endParaRPr lang="en-US" dirty="0"/>
-          </a:p>
-        </p:txBody>
-      </p:sp>
-    </p:spTree>
-    <p:extLst>
-      <p:ext uri="{BB962C8B-B14F-4D97-AF65-F5344CB8AC3E}">
-        <p14:creationId xmlns:p14="http://schemas.microsoft.com/office/powerpoint/2010/main" val="3262108993"/>
-      </p:ext>
-    </p:extLst>
-  </p:cSld>
-  <p:clrMapOvr>
-    <a:masterClrMapping/>
-  </p:clrMapOvr>
-</p:notes>
-</file>
-
-<file path=ppt/notesSlides/notesSlide4.xml><?xml version="1.0" encoding="utf-8"?>
+<file path=ppt/notesSlides/notesSlide5.xml><?xml version="1.0" encoding="utf-8"?>
 <p:notes xmlns:a="http://schemas.openxmlformats.org/drawingml/2006/main" xmlns:r="http://schemas.openxmlformats.org/officeDocument/2006/relationships" xmlns:p="http://schemas.openxmlformats.org/presentationml/2006/main" showMasterSp="0" showMasterPhAnim="0">
   <p:cSld>
     <p:spTree>
@@ -1623,7 +1577,7 @@
     </p:spTree>
     <p:extLst>
       <p:ext uri="{BB962C8B-B14F-4D97-AF65-F5344CB8AC3E}">
-        <p14:creationId xmlns:p14="http://schemas.microsoft.com/office/powerpoint/2010/main" val="1293070"/>
+        <p14:creationId xmlns:p14="http://schemas.microsoft.com/office/powerpoint/2010/main" val="4283707847"/>
       </p:ext>
     </p:extLst>
   </p:cSld>
@@ -1633,7 +1587,7 @@
 </p:notes>
 </file>
 
-<file path=ppt/notesSlides/notesSlide5.xml><?xml version="1.0" encoding="utf-8"?>
+<file path=ppt/notesSlides/notesSlide6.xml><?xml version="1.0" encoding="utf-8"?>
 <p:notes xmlns:a="http://schemas.openxmlformats.org/drawingml/2006/main" xmlns:r="http://schemas.openxmlformats.org/officeDocument/2006/relationships" xmlns:p="http://schemas.openxmlformats.org/presentationml/2006/main">
   <p:cSld>
     <p:spTree>
@@ -1682,9 +1636,6 @@
           <a:bodyPr/>
           <a:lstStyle/>
           <a:p>
-            <a:pPr marL="158750" indent="0" algn="l">
-              <a:buNone/>
-            </a:pPr>
             <a:endParaRPr lang="en-US" dirty="0"/>
           </a:p>
         </p:txBody>
@@ -1692,7 +1643,7 @@
     </p:spTree>
     <p:extLst>
       <p:ext uri="{BB962C8B-B14F-4D97-AF65-F5344CB8AC3E}">
-        <p14:creationId xmlns:p14="http://schemas.microsoft.com/office/powerpoint/2010/main" val="3113012134"/>
+        <p14:creationId xmlns:p14="http://schemas.microsoft.com/office/powerpoint/2010/main" val="536918034"/>
       </p:ext>
     </p:extLst>
   </p:cSld>
@@ -1702,7 +1653,7 @@
 </p:notes>
 </file>
 
-<file path=ppt/notesSlides/notesSlide6.xml><?xml version="1.0" encoding="utf-8"?>
+<file path=ppt/notesSlides/notesSlide7.xml><?xml version="1.0" encoding="utf-8"?>
 <p:notes xmlns:a="http://schemas.openxmlformats.org/drawingml/2006/main" xmlns:r="http://schemas.openxmlformats.org/officeDocument/2006/relationships" xmlns:p="http://schemas.openxmlformats.org/presentationml/2006/main" showMasterSp="0" showMasterPhAnim="0">
   <p:cSld>
     <p:spTree>
@@ -1801,7 +1752,7 @@
     </p:spTree>
     <p:extLst>
       <p:ext uri="{BB962C8B-B14F-4D97-AF65-F5344CB8AC3E}">
-        <p14:creationId xmlns:p14="http://schemas.microsoft.com/office/powerpoint/2010/main" val="4283707847"/>
+        <p14:creationId xmlns:p14="http://schemas.microsoft.com/office/powerpoint/2010/main" val="3798269481"/>
       </p:ext>
     </p:extLst>
   </p:cSld>
@@ -1811,7 +1762,7 @@
 </p:notes>
 </file>
 
-<file path=ppt/notesSlides/notesSlide7.xml><?xml version="1.0" encoding="utf-8"?>
+<file path=ppt/notesSlides/notesSlide8.xml><?xml version="1.0" encoding="utf-8"?>
 <p:notes xmlns:a="http://schemas.openxmlformats.org/drawingml/2006/main" xmlns:r="http://schemas.openxmlformats.org/officeDocument/2006/relationships" xmlns:p="http://schemas.openxmlformats.org/presentationml/2006/main">
   <p:cSld>
     <p:spTree>
@@ -1860,6 +1811,9 @@
           <a:bodyPr/>
           <a:lstStyle/>
           <a:p>
+            <a:pPr marL="158750" indent="0" algn="l">
+              <a:buNone/>
+            </a:pPr>
             <a:endParaRPr lang="en-US" dirty="0"/>
           </a:p>
         </p:txBody>
@@ -1867,7 +1821,7 @@
     </p:spTree>
     <p:extLst>
       <p:ext uri="{BB962C8B-B14F-4D97-AF65-F5344CB8AC3E}">
-        <p14:creationId xmlns:p14="http://schemas.microsoft.com/office/powerpoint/2010/main" val="536918034"/>
+        <p14:creationId xmlns:p14="http://schemas.microsoft.com/office/powerpoint/2010/main" val="2961899693"/>
       </p:ext>
     </p:extLst>
   </p:cSld>
@@ -1877,7 +1831,7 @@
 </p:notes>
 </file>
 
-<file path=ppt/notesSlides/notesSlide8.xml><?xml version="1.0" encoding="utf-8"?>
+<file path=ppt/notesSlides/notesSlide9.xml><?xml version="1.0" encoding="utf-8"?>
 <p:notes xmlns:a="http://schemas.openxmlformats.org/drawingml/2006/main" xmlns:r="http://schemas.openxmlformats.org/officeDocument/2006/relationships" xmlns:p="http://schemas.openxmlformats.org/presentationml/2006/main" showMasterSp="0" showMasterPhAnim="0">
   <p:cSld>
     <p:spTree>
@@ -1976,76 +1930,7 @@
     </p:spTree>
     <p:extLst>
       <p:ext uri="{BB962C8B-B14F-4D97-AF65-F5344CB8AC3E}">
-        <p14:creationId xmlns:p14="http://schemas.microsoft.com/office/powerpoint/2010/main" val="3798269481"/>
-      </p:ext>
-    </p:extLst>
-  </p:cSld>
-  <p:clrMapOvr>
-    <a:masterClrMapping/>
-  </p:clrMapOvr>
-</p:notes>
-</file>
-
-<file path=ppt/notesSlides/notesSlide9.xml><?xml version="1.0" encoding="utf-8"?>
-<p:notes xmlns:a="http://schemas.openxmlformats.org/drawingml/2006/main" xmlns:r="http://schemas.openxmlformats.org/officeDocument/2006/relationships" xmlns:p="http://schemas.openxmlformats.org/presentationml/2006/main">
-  <p:cSld>
-    <p:spTree>
-      <p:nvGrpSpPr>
-        <p:cNvPr id="1" name=""/>
-        <p:cNvGrpSpPr/>
-        <p:nvPr/>
-      </p:nvGrpSpPr>
-      <p:grpSpPr>
-        <a:xfrm>
-          <a:off x="0" y="0"/>
-          <a:ext cx="0" cy="0"/>
-          <a:chOff x="0" y="0"/>
-          <a:chExt cx="0" cy="0"/>
-        </a:xfrm>
-      </p:grpSpPr>
-      <p:sp>
-        <p:nvSpPr>
-          <p:cNvPr id="2" name="Slide Image Placeholder 1"/>
-          <p:cNvSpPr>
-            <a:spLocks noGrp="1" noRot="1" noChangeAspect="1"/>
-          </p:cNvSpPr>
-          <p:nvPr>
-            <p:ph type="sldImg"/>
-          </p:nvPr>
-        </p:nvSpPr>
-        <p:spPr>
-          <a:xfrm>
-            <a:off x="381000" y="685800"/>
-            <a:ext cx="6096000" cy="3429000"/>
-          </a:xfrm>
-        </p:spPr>
-      </p:sp>
-      <p:sp>
-        <p:nvSpPr>
-          <p:cNvPr id="3" name="Notes Placeholder 2"/>
-          <p:cNvSpPr>
-            <a:spLocks noGrp="1"/>
-          </p:cNvSpPr>
-          <p:nvPr>
-            <p:ph type="body" idx="1"/>
-          </p:nvPr>
-        </p:nvSpPr>
-        <p:spPr/>
-        <p:txBody>
-          <a:bodyPr/>
-          <a:lstStyle/>
-          <a:p>
-            <a:pPr marL="158750" indent="0" algn="l">
-              <a:buNone/>
-            </a:pPr>
-            <a:endParaRPr lang="en-US" dirty="0"/>
-          </a:p>
-        </p:txBody>
-      </p:sp>
-    </p:spTree>
-    <p:extLst>
-      <p:ext uri="{BB962C8B-B14F-4D97-AF65-F5344CB8AC3E}">
-        <p14:creationId xmlns:p14="http://schemas.microsoft.com/office/powerpoint/2010/main" val="2961899693"/>
+        <p14:creationId xmlns:p14="http://schemas.microsoft.com/office/powerpoint/2010/main" val="2269277385"/>
       </p:ext>
     </p:extLst>
   </p:cSld>
@@ -7840,152 +7725,6 @@
   <p:cSld>
     <p:spTree>
       <p:nvGrpSpPr>
-        <p:cNvPr id="1" name="Shape 146"/>
-        <p:cNvGrpSpPr/>
-        <p:nvPr/>
-      </p:nvGrpSpPr>
-      <p:grpSpPr>
-        <a:xfrm>
-          <a:off x="0" y="0"/>
-          <a:ext cx="0" cy="0"/>
-          <a:chOff x="0" y="0"/>
-          <a:chExt cx="0" cy="0"/>
-        </a:xfrm>
-      </p:grpSpPr>
-      <p:sp>
-        <p:nvSpPr>
-          <p:cNvPr id="147" name="Google Shape;147;p25"/>
-          <p:cNvSpPr txBox="1">
-            <a:spLocks noGrp="1"/>
-          </p:cNvSpPr>
-          <p:nvPr>
-            <p:ph type="title"/>
-          </p:nvPr>
-        </p:nvSpPr>
-        <p:spPr>
-          <a:xfrm>
-            <a:off x="705000" y="2516825"/>
-            <a:ext cx="8520600" cy="572700"/>
-          </a:xfrm>
-          <a:prstGeom prst="rect">
-            <a:avLst/>
-          </a:prstGeom>
-        </p:spPr>
-        <p:txBody>
-          <a:bodyPr spcFirstLastPara="1" wrap="square" lIns="91400" tIns="91400" rIns="91400" bIns="91400" anchor="b" anchorCtr="0">
-            <a:noAutofit/>
-          </a:bodyPr>
-          <a:lstStyle/>
-          <a:p>
-            <a:pPr marL="0" lvl="0" indent="0" algn="l" rtl="0">
-              <a:spcBef>
-                <a:spcPts val="0"/>
-              </a:spcBef>
-              <a:spcAft>
-                <a:spcPts val="0"/>
-              </a:spcAft>
-              <a:buNone/>
-            </a:pPr>
-            <a:r>
-              <a:rPr lang="en-US" sz="2800" dirty="0">
-                <a:solidFill>
-                  <a:srgbClr val="00DFFF"/>
-                </a:solidFill>
-              </a:rPr>
-              <a:t>Patterns &amp; Practices</a:t>
-            </a:r>
-            <a:endParaRPr sz="2800" dirty="0">
-              <a:solidFill>
-                <a:srgbClr val="00DFFF"/>
-              </a:solidFill>
-            </a:endParaRPr>
-          </a:p>
-          <a:p>
-            <a:pPr marL="0" lvl="0" indent="0" algn="l" rtl="0">
-              <a:spcBef>
-                <a:spcPts val="0"/>
-              </a:spcBef>
-              <a:spcAft>
-                <a:spcPts val="0"/>
-              </a:spcAft>
-              <a:buNone/>
-            </a:pPr>
-            <a:r>
-              <a:rPr lang="en" sz="3200" dirty="0">
-                <a:solidFill>
-                  <a:schemeClr val="lt1"/>
-                </a:solidFill>
-              </a:rPr>
-              <a:t>Higher Order Components</a:t>
-            </a:r>
-            <a:endParaRPr sz="3200" dirty="0">
-              <a:solidFill>
-                <a:schemeClr val="lt1"/>
-              </a:solidFill>
-            </a:endParaRPr>
-          </a:p>
-        </p:txBody>
-      </p:sp>
-      <p:sp>
-        <p:nvSpPr>
-          <p:cNvPr id="149" name="Google Shape;149;p25"/>
-          <p:cNvSpPr txBox="1">
-            <a:spLocks noGrp="1"/>
-          </p:cNvSpPr>
-          <p:nvPr>
-            <p:ph type="sldNum" idx="12"/>
-          </p:nvPr>
-        </p:nvSpPr>
-        <p:spPr>
-          <a:xfrm>
-            <a:off x="8556784" y="4749851"/>
-            <a:ext cx="548700" cy="393600"/>
-          </a:xfrm>
-          <a:prstGeom prst="rect">
-            <a:avLst/>
-          </a:prstGeom>
-        </p:spPr>
-        <p:txBody>
-          <a:bodyPr spcFirstLastPara="1" wrap="square" lIns="91425" tIns="91425" rIns="91425" bIns="91425" anchor="t" anchorCtr="0">
-            <a:noAutofit/>
-          </a:bodyPr>
-          <a:lstStyle/>
-          <a:p>
-            <a:pPr marL="0" lvl="0" indent="0" algn="r" rtl="0">
-              <a:spcBef>
-                <a:spcPts val="0"/>
-              </a:spcBef>
-              <a:spcAft>
-                <a:spcPts val="0"/>
-              </a:spcAft>
-              <a:buNone/>
-            </a:pPr>
-            <a:fld id="{00000000-1234-1234-1234-123412341234}" type="slidenum">
-              <a:rPr lang="en"/>
-              <a:t>10</a:t>
-            </a:fld>
-            <a:endParaRPr/>
-          </a:p>
-        </p:txBody>
-      </p:sp>
-    </p:spTree>
-    <p:extLst>
-      <p:ext uri="{BB962C8B-B14F-4D97-AF65-F5344CB8AC3E}">
-        <p14:creationId xmlns:p14="http://schemas.microsoft.com/office/powerpoint/2010/main" val="2419170171"/>
-      </p:ext>
-    </p:extLst>
-  </p:cSld>
-  <p:clrMapOvr>
-    <a:masterClrMapping/>
-  </p:clrMapOvr>
-</p:sld>
-</file>
-
-<file path=ppt/slides/slide11.xml><?xml version="1.0" encoding="utf-8"?>
-<p:sld xmlns:a="http://schemas.openxmlformats.org/drawingml/2006/main" xmlns:r="http://schemas.openxmlformats.org/officeDocument/2006/relationships" xmlns:p="http://schemas.openxmlformats.org/presentationml/2006/main">
-  <p:cSld>
-    <p:spTree>
-      <p:nvGrpSpPr>
         <p:cNvPr id="1" name=""/>
         <p:cNvGrpSpPr/>
         <p:nvPr/>
@@ -8140,7 +7879,7 @@
             </a:pPr>
             <a:fld id="{00000000-1234-1234-1234-123412341234}" type="slidenum">
               <a:rPr lang="en" smtClean="0"/>
-              <a:t>11</a:t>
+              <a:t>10</a:t>
             </a:fld>
             <a:endParaRPr lang="en"/>
           </a:p>
@@ -9929,17 +9668,17 @@
               <a:t> </a:t>
             </a:r>
             <a:r>
-              <a:rPr lang="en-US" sz="900" b="0" dirty="0" err="1">
+              <a:rPr lang="en-US" sz="900" b="0">
                 <a:solidFill>
                   <a:srgbClr val="DCDCAA"/>
                 </a:solidFill>
                 <a:effectLst/>
                 <a:latin typeface="Menlo" panose="020B0609030804020204" pitchFamily="49" charset="0"/>
               </a:rPr>
-              <a:t>withCount</a:t>
-            </a:r>
-            <a:r>
-              <a:rPr lang="en-US" sz="900" b="0" dirty="0">
+              <a:t>withCounter</a:t>
+            </a:r>
+            <a:r>
+              <a:rPr lang="en-US" sz="900" b="0">
                 <a:solidFill>
                   <a:srgbClr val="D4D4D4"/>
                 </a:solidFill>
@@ -9987,7 +9726,7 @@
 </p:sld>
 </file>
 
-<file path=ppt/slides/slide12.xml><?xml version="1.0" encoding="utf-8"?>
+<file path=ppt/slides/slide11.xml><?xml version="1.0" encoding="utf-8"?>
 <p:sld xmlns:a="http://schemas.openxmlformats.org/drawingml/2006/main" xmlns:r="http://schemas.openxmlformats.org/officeDocument/2006/relationships" xmlns:p="http://schemas.openxmlformats.org/presentationml/2006/main">
   <p:cSld>
     <p:spTree>
@@ -10130,7 +9869,7 @@
             </a:pPr>
             <a:fld id="{00000000-1234-1234-1234-123412341234}" type="slidenum">
               <a:rPr lang="en"/>
-              <a:t>12</a:t>
+              <a:t>11</a:t>
             </a:fld>
             <a:endParaRPr/>
           </a:p>
@@ -10149,7 +9888,7 @@
 </p:sld>
 </file>
 
-<file path=ppt/slides/slide13.xml><?xml version="1.0" encoding="utf-8"?>
+<file path=ppt/slides/slide12.xml><?xml version="1.0" encoding="utf-8"?>
 <p:sld xmlns:a="http://schemas.openxmlformats.org/drawingml/2006/main" xmlns:r="http://schemas.openxmlformats.org/officeDocument/2006/relationships" xmlns:p="http://schemas.openxmlformats.org/presentationml/2006/main">
   <p:cSld>
     <p:spTree>
@@ -10371,7 +10110,7 @@
             </a:pPr>
             <a:fld id="{00000000-1234-1234-1234-123412341234}" type="slidenum">
               <a:rPr lang="en" smtClean="0"/>
-              <a:t>13</a:t>
+              <a:t>12</a:t>
             </a:fld>
             <a:endParaRPr lang="en"/>
           </a:p>
@@ -10390,7 +10129,7 @@
 </p:sld>
 </file>
 
-<file path=ppt/slides/slide14.xml><?xml version="1.0" encoding="utf-8"?>
+<file path=ppt/slides/slide13.xml><?xml version="1.0" encoding="utf-8"?>
 <p:sld xmlns:a="http://schemas.openxmlformats.org/drawingml/2006/main" xmlns:r="http://schemas.openxmlformats.org/officeDocument/2006/relationships" xmlns:p="http://schemas.openxmlformats.org/presentationml/2006/main">
   <p:cSld>
     <p:spTree>
@@ -10517,7 +10256,7 @@
             </a:pPr>
             <a:fld id="{00000000-1234-1234-1234-123412341234}" type="slidenum">
               <a:rPr lang="en"/>
-              <a:t>14</a:t>
+              <a:t>13</a:t>
             </a:fld>
             <a:endParaRPr/>
           </a:p>
@@ -10536,7 +10275,7 @@
 </p:sld>
 </file>
 
-<file path=ppt/slides/slide15.xml><?xml version="1.0" encoding="utf-8"?>
+<file path=ppt/slides/slide14.xml><?xml version="1.0" encoding="utf-8"?>
 <p:sld xmlns:a="http://schemas.openxmlformats.org/drawingml/2006/main" xmlns:r="http://schemas.openxmlformats.org/officeDocument/2006/relationships" xmlns:p="http://schemas.openxmlformats.org/presentationml/2006/main">
   <p:cSld>
     <p:spTree>
@@ -10679,7 +10418,7 @@
             </a:pPr>
             <a:fld id="{00000000-1234-1234-1234-123412341234}" type="slidenum">
               <a:rPr lang="en" smtClean="0"/>
-              <a:t>15</a:t>
+              <a:t>14</a:t>
             </a:fld>
             <a:endParaRPr lang="en"/>
           </a:p>
@@ -12561,7 +12300,7 @@
 </p:sld>
 </file>
 
-<file path=ppt/slides/slide16.xml><?xml version="1.0" encoding="utf-8"?>
+<file path=ppt/slides/slide15.xml><?xml version="1.0" encoding="utf-8"?>
 <p:sld xmlns:a="http://schemas.openxmlformats.org/drawingml/2006/main" xmlns:r="http://schemas.openxmlformats.org/officeDocument/2006/relationships" xmlns:p="http://schemas.openxmlformats.org/presentationml/2006/main">
   <p:cSld>
     <p:bg>
@@ -13004,7 +12743,7 @@
             </a:pPr>
             <a:fld id="{00000000-1234-1234-1234-123412341234}" type="slidenum">
               <a:rPr lang="en"/>
-              <a:t>16</a:t>
+              <a:t>15</a:t>
             </a:fld>
             <a:endParaRPr/>
           </a:p>
@@ -13135,26 +12874,6 @@
               <a:buChar char="●"/>
             </a:pPr>
             <a:r>
-              <a:rPr lang="en-US" dirty="0"/>
-              <a:t>Building a </a:t>
-            </a:r>
-            <a:r>
-              <a:rPr lang="en-US" dirty="0" err="1"/>
-              <a:t>Giphy</a:t>
-            </a:r>
-            <a:r>
-              <a:rPr lang="en-US" dirty="0"/>
-              <a:t> App</a:t>
-            </a:r>
-          </a:p>
-          <a:p>
-            <a:pPr lvl="1" indent="-323850">
-              <a:lnSpc>
-                <a:spcPct val="150000"/>
-              </a:lnSpc>
-              <a:buChar char="●"/>
-            </a:pPr>
-            <a:r>
               <a:rPr lang="en-US" dirty="0" err="1"/>
               <a:t>PropTypes</a:t>
             </a:r>
@@ -14041,468 +13760,6 @@
   <p:cSld>
     <p:spTree>
       <p:nvGrpSpPr>
-        <p:cNvPr id="1" name="Shape 278"/>
-        <p:cNvGrpSpPr/>
-        <p:nvPr/>
-      </p:nvGrpSpPr>
-      <p:grpSpPr>
-        <a:xfrm>
-          <a:off x="0" y="0"/>
-          <a:ext cx="0" cy="0"/>
-          <a:chOff x="0" y="0"/>
-          <a:chExt cx="0" cy="0"/>
-        </a:xfrm>
-      </p:grpSpPr>
-      <p:pic>
-        <p:nvPicPr>
-          <p:cNvPr id="279" name="Google Shape;279;p36"/>
-          <p:cNvPicPr preferRelativeResize="0"/>
-          <p:nvPr/>
-        </p:nvPicPr>
-        <p:blipFill>
-          <a:blip r:embed="rId3">
-            <a:alphaModFix amt="37000"/>
-          </a:blip>
-          <a:stretch>
-            <a:fillRect/>
-          </a:stretch>
-        </p:blipFill>
-        <p:spPr>
-          <a:xfrm>
-            <a:off x="1369354" y="158875"/>
-            <a:ext cx="5070393" cy="5143501"/>
-          </a:xfrm>
-          <a:prstGeom prst="rect">
-            <a:avLst/>
-          </a:prstGeom>
-          <a:noFill/>
-          <a:ln>
-            <a:noFill/>
-          </a:ln>
-        </p:spPr>
-      </p:pic>
-      <p:sp>
-        <p:nvSpPr>
-          <p:cNvPr id="280" name="Google Shape;280;p36"/>
-          <p:cNvSpPr/>
-          <p:nvPr/>
-        </p:nvSpPr>
-        <p:spPr>
-          <a:xfrm flipH="1">
-            <a:off x="770425" y="2009875"/>
-            <a:ext cx="2226300" cy="114000"/>
-          </a:xfrm>
-          <a:prstGeom prst="rect">
-            <a:avLst/>
-          </a:prstGeom>
-          <a:solidFill>
-            <a:schemeClr val="accent6"/>
-          </a:solidFill>
-          <a:ln>
-            <a:noFill/>
-          </a:ln>
-        </p:spPr>
-        <p:txBody>
-          <a:bodyPr spcFirstLastPara="1" wrap="square" lIns="91425" tIns="91425" rIns="91425" bIns="91425" anchor="ctr" anchorCtr="0">
-            <a:noAutofit/>
-          </a:bodyPr>
-          <a:lstStyle/>
-          <a:p>
-            <a:pPr marL="0" lvl="0" indent="0" algn="l" rtl="0">
-              <a:spcBef>
-                <a:spcPts val="0"/>
-              </a:spcBef>
-              <a:spcAft>
-                <a:spcPts val="0"/>
-              </a:spcAft>
-              <a:buNone/>
-            </a:pPr>
-            <a:endParaRPr/>
-          </a:p>
-        </p:txBody>
-      </p:sp>
-      <p:grpSp>
-        <p:nvGrpSpPr>
-          <p:cNvPr id="281" name="Google Shape;281;p36"/>
-          <p:cNvGrpSpPr/>
-          <p:nvPr/>
-        </p:nvGrpSpPr>
-        <p:grpSpPr>
-          <a:xfrm>
-            <a:off x="4491032" y="1168875"/>
-            <a:ext cx="4689327" cy="4991730"/>
-            <a:chOff x="3458352" y="512656"/>
-            <a:chExt cx="5769350" cy="5951747"/>
-          </a:xfrm>
-        </p:grpSpPr>
-        <p:pic>
-          <p:nvPicPr>
-            <p:cNvPr id="282" name="Google Shape;282;p36"/>
-            <p:cNvPicPr preferRelativeResize="0"/>
-            <p:nvPr/>
-          </p:nvPicPr>
-          <p:blipFill>
-            <a:blip r:embed="rId4">
-              <a:alphaModFix amt="64000"/>
-            </a:blip>
-            <a:stretch>
-              <a:fillRect/>
-            </a:stretch>
-          </p:blipFill>
-          <p:spPr>
-            <a:xfrm rot="-5400000">
-              <a:off x="4778715" y="2015416"/>
-              <a:ext cx="5951747" cy="2946227"/>
-            </a:xfrm>
-            <a:prstGeom prst="rect">
-              <a:avLst/>
-            </a:prstGeom>
-            <a:noFill/>
-            <a:ln>
-              <a:noFill/>
-            </a:ln>
-          </p:spPr>
-        </p:pic>
-        <p:pic>
-          <p:nvPicPr>
-            <p:cNvPr id="283" name="Google Shape;283;p36"/>
-            <p:cNvPicPr preferRelativeResize="0"/>
-            <p:nvPr/>
-          </p:nvPicPr>
-          <p:blipFill>
-            <a:blip r:embed="rId4">
-              <a:alphaModFix amt="64000"/>
-            </a:blip>
-            <a:stretch>
-              <a:fillRect/>
-            </a:stretch>
-          </p:blipFill>
-          <p:spPr>
-            <a:xfrm rot="-5400000">
-              <a:off x="1955593" y="2015416"/>
-              <a:ext cx="5951747" cy="2946227"/>
-            </a:xfrm>
-            <a:prstGeom prst="rect">
-              <a:avLst/>
-            </a:prstGeom>
-            <a:noFill/>
-            <a:ln>
-              <a:noFill/>
-            </a:ln>
-          </p:spPr>
-        </p:pic>
-      </p:grpSp>
-      <p:sp>
-        <p:nvSpPr>
-          <p:cNvPr id="284" name="Google Shape;284;p36"/>
-          <p:cNvSpPr/>
-          <p:nvPr/>
-        </p:nvSpPr>
-        <p:spPr>
-          <a:xfrm rot="5400000">
-            <a:off x="347275" y="2418450"/>
-            <a:ext cx="929700" cy="113100"/>
-          </a:xfrm>
-          <a:prstGeom prst="rect">
-            <a:avLst/>
-          </a:prstGeom>
-          <a:solidFill>
-            <a:schemeClr val="accent6"/>
-          </a:solidFill>
-          <a:ln>
-            <a:noFill/>
-          </a:ln>
-        </p:spPr>
-        <p:txBody>
-          <a:bodyPr spcFirstLastPara="1" wrap="square" lIns="91425" tIns="91425" rIns="91425" bIns="91425" anchor="ctr" anchorCtr="0">
-            <a:noAutofit/>
-          </a:bodyPr>
-          <a:lstStyle/>
-          <a:p>
-            <a:pPr marL="0" lvl="0" indent="0" algn="l" rtl="0">
-              <a:spcBef>
-                <a:spcPts val="0"/>
-              </a:spcBef>
-              <a:spcAft>
-                <a:spcPts val="0"/>
-              </a:spcAft>
-              <a:buNone/>
-            </a:pPr>
-            <a:endParaRPr/>
-          </a:p>
-        </p:txBody>
-      </p:sp>
-      <p:sp>
-        <p:nvSpPr>
-          <p:cNvPr id="285" name="Google Shape;285;p36"/>
-          <p:cNvSpPr/>
-          <p:nvPr/>
-        </p:nvSpPr>
-        <p:spPr>
-          <a:xfrm rot="5400000">
-            <a:off x="1932200" y="1005450"/>
-            <a:ext cx="2124000" cy="113100"/>
-          </a:xfrm>
-          <a:prstGeom prst="rect">
-            <a:avLst/>
-          </a:prstGeom>
-          <a:solidFill>
-            <a:schemeClr val="accent6"/>
-          </a:solidFill>
-          <a:ln>
-            <a:noFill/>
-          </a:ln>
-        </p:spPr>
-        <p:txBody>
-          <a:bodyPr spcFirstLastPara="1" wrap="square" lIns="91425" tIns="91425" rIns="91425" bIns="91425" anchor="ctr" anchorCtr="0">
-            <a:noAutofit/>
-          </a:bodyPr>
-          <a:lstStyle/>
-          <a:p>
-            <a:pPr marL="0" lvl="0" indent="0" algn="l" rtl="0">
-              <a:spcBef>
-                <a:spcPts val="0"/>
-              </a:spcBef>
-              <a:spcAft>
-                <a:spcPts val="0"/>
-              </a:spcAft>
-              <a:buNone/>
-            </a:pPr>
-            <a:endParaRPr/>
-          </a:p>
-        </p:txBody>
-      </p:sp>
-      <p:sp>
-        <p:nvSpPr>
-          <p:cNvPr id="286" name="Google Shape;286;p36"/>
-          <p:cNvSpPr txBox="1">
-            <a:spLocks noGrp="1"/>
-          </p:cNvSpPr>
-          <p:nvPr>
-            <p:ph type="title" idx="4294967295"/>
-          </p:nvPr>
-        </p:nvSpPr>
-        <p:spPr>
-          <a:xfrm>
-            <a:off x="1038750" y="2333550"/>
-            <a:ext cx="7164000" cy="2555400"/>
-          </a:xfrm>
-          <a:prstGeom prst="rect">
-            <a:avLst/>
-          </a:prstGeom>
-        </p:spPr>
-        <p:txBody>
-          <a:bodyPr spcFirstLastPara="1" wrap="square" lIns="91400" tIns="91400" rIns="91400" bIns="91400" anchor="t" anchorCtr="0">
-            <a:noAutofit/>
-          </a:bodyPr>
-          <a:lstStyle/>
-          <a:p>
-            <a:pPr marL="0" lvl="0" indent="0" algn="l" rtl="0">
-              <a:lnSpc>
-                <a:spcPct val="83000"/>
-              </a:lnSpc>
-              <a:spcBef>
-                <a:spcPts val="0"/>
-              </a:spcBef>
-              <a:spcAft>
-                <a:spcPts val="0"/>
-              </a:spcAft>
-              <a:buNone/>
-            </a:pPr>
-            <a:r>
-              <a:rPr lang="en-US" sz="4500" dirty="0">
-                <a:solidFill>
-                  <a:schemeClr val="lt1"/>
-                </a:solidFill>
-              </a:rPr>
-              <a:t>Let’s build a </a:t>
-            </a:r>
-            <a:r>
-              <a:rPr lang="en-US" sz="4500" dirty="0" err="1">
-                <a:solidFill>
-                  <a:schemeClr val="lt1"/>
-                </a:solidFill>
-              </a:rPr>
-              <a:t>Giphy</a:t>
-            </a:r>
-            <a:r>
-              <a:rPr lang="en-US" sz="4500" dirty="0">
-                <a:solidFill>
-                  <a:schemeClr val="lt1"/>
-                </a:solidFill>
-              </a:rPr>
-              <a:t> App!</a:t>
-            </a:r>
-            <a:endParaRPr sz="4500" dirty="0">
-              <a:solidFill>
-                <a:schemeClr val="lt1"/>
-              </a:solidFill>
-            </a:endParaRPr>
-          </a:p>
-          <a:p>
-            <a:pPr marL="0" lvl="0" indent="0" algn="l" rtl="0">
-              <a:lnSpc>
-                <a:spcPct val="115000"/>
-              </a:lnSpc>
-              <a:spcBef>
-                <a:spcPts val="0"/>
-              </a:spcBef>
-              <a:spcAft>
-                <a:spcPts val="0"/>
-              </a:spcAft>
-              <a:buNone/>
-            </a:pPr>
-            <a:endParaRPr sz="1900" dirty="0">
-              <a:solidFill>
-                <a:schemeClr val="lt1"/>
-              </a:solidFill>
-            </a:endParaRPr>
-          </a:p>
-        </p:txBody>
-      </p:sp>
-      <p:pic>
-        <p:nvPicPr>
-          <p:cNvPr id="287" name="Google Shape;287;p36" descr="Google Shape;299;p42"/>
-          <p:cNvPicPr preferRelativeResize="0"/>
-          <p:nvPr/>
-        </p:nvPicPr>
-        <p:blipFill rotWithShape="1">
-          <a:blip r:embed="rId5">
-            <a:alphaModFix amt="38000"/>
-          </a:blip>
-          <a:srcRect/>
-          <a:stretch/>
-        </p:blipFill>
-        <p:spPr>
-          <a:xfrm>
-            <a:off x="5053325" y="2333550"/>
-            <a:ext cx="1179012" cy="866975"/>
-          </a:xfrm>
-          <a:prstGeom prst="rect">
-            <a:avLst/>
-          </a:prstGeom>
-          <a:noFill/>
-          <a:ln>
-            <a:noFill/>
-          </a:ln>
-        </p:spPr>
-      </p:pic>
-      <p:pic>
-        <p:nvPicPr>
-          <p:cNvPr id="288" name="Google Shape;288;p36"/>
-          <p:cNvPicPr preferRelativeResize="0"/>
-          <p:nvPr/>
-        </p:nvPicPr>
-        <p:blipFill>
-          <a:blip r:embed="rId6">
-            <a:alphaModFix/>
-          </a:blip>
-          <a:stretch>
-            <a:fillRect/>
-          </a:stretch>
-        </p:blipFill>
-        <p:spPr>
-          <a:xfrm>
-            <a:off x="9306200" y="4594175"/>
-            <a:ext cx="1355525" cy="294675"/>
-          </a:xfrm>
-          <a:prstGeom prst="rect">
-            <a:avLst/>
-          </a:prstGeom>
-          <a:noFill/>
-          <a:ln>
-            <a:noFill/>
-          </a:ln>
-        </p:spPr>
-      </p:pic>
-      <p:pic>
-        <p:nvPicPr>
-          <p:cNvPr id="289" name="Google Shape;289;p36"/>
-          <p:cNvPicPr preferRelativeResize="0"/>
-          <p:nvPr/>
-        </p:nvPicPr>
-        <p:blipFill>
-          <a:blip r:embed="rId7">
-            <a:alphaModFix/>
-          </a:blip>
-          <a:stretch>
-            <a:fillRect/>
-          </a:stretch>
-        </p:blipFill>
-        <p:spPr>
-          <a:xfrm>
-            <a:off x="6848213" y="4187750"/>
-            <a:ext cx="2049536" cy="929699"/>
-          </a:xfrm>
-          <a:prstGeom prst="rect">
-            <a:avLst/>
-          </a:prstGeom>
-          <a:noFill/>
-          <a:ln>
-            <a:noFill/>
-          </a:ln>
-        </p:spPr>
-      </p:pic>
-      <p:sp>
-        <p:nvSpPr>
-          <p:cNvPr id="290" name="Google Shape;290;p36"/>
-          <p:cNvSpPr txBox="1">
-            <a:spLocks noGrp="1"/>
-          </p:cNvSpPr>
-          <p:nvPr>
-            <p:ph type="sldNum" idx="12"/>
-          </p:nvPr>
-        </p:nvSpPr>
-        <p:spPr>
-          <a:xfrm>
-            <a:off x="8556784" y="4749851"/>
-            <a:ext cx="548700" cy="393600"/>
-          </a:xfrm>
-          <a:prstGeom prst="rect">
-            <a:avLst/>
-          </a:prstGeom>
-        </p:spPr>
-        <p:txBody>
-          <a:bodyPr spcFirstLastPara="1" wrap="square" lIns="91425" tIns="91425" rIns="91425" bIns="91425" anchor="t" anchorCtr="0">
-            <a:noAutofit/>
-          </a:bodyPr>
-          <a:lstStyle/>
-          <a:p>
-            <a:pPr marL="0" lvl="0" indent="0" algn="r" rtl="0">
-              <a:spcBef>
-                <a:spcPts val="0"/>
-              </a:spcBef>
-              <a:spcAft>
-                <a:spcPts val="0"/>
-              </a:spcAft>
-              <a:buNone/>
-            </a:pPr>
-            <a:fld id="{00000000-1234-1234-1234-123412341234}" type="slidenum">
-              <a:rPr lang="en"/>
-              <a:t>5</a:t>
-            </a:fld>
-            <a:endParaRPr/>
-          </a:p>
-        </p:txBody>
-      </p:sp>
-    </p:spTree>
-    <p:extLst>
-      <p:ext uri="{BB962C8B-B14F-4D97-AF65-F5344CB8AC3E}">
-        <p14:creationId xmlns:p14="http://schemas.microsoft.com/office/powerpoint/2010/main" val="3939398222"/>
-      </p:ext>
-    </p:extLst>
-  </p:cSld>
-  <p:clrMapOvr>
-    <a:masterClrMapping/>
-  </p:clrMapOvr>
-</p:sld>
-</file>
-
-<file path=ppt/slides/slide6.xml><?xml version="1.0" encoding="utf-8"?>
-<p:sld xmlns:a="http://schemas.openxmlformats.org/drawingml/2006/main" xmlns:r="http://schemas.openxmlformats.org/officeDocument/2006/relationships" xmlns:p="http://schemas.openxmlformats.org/presentationml/2006/main">
-  <p:cSld>
-    <p:spTree>
-      <p:nvGrpSpPr>
         <p:cNvPr id="1" name="Shape 146"/>
         <p:cNvGrpSpPr/>
         <p:nvPr/>
@@ -14625,7 +13882,7 @@
             </a:pPr>
             <a:fld id="{00000000-1234-1234-1234-123412341234}" type="slidenum">
               <a:rPr lang="en"/>
-              <a:t>6</a:t>
+              <a:t>5</a:t>
             </a:fld>
             <a:endParaRPr/>
           </a:p>
@@ -14644,7 +13901,7 @@
 </p:sld>
 </file>
 
-<file path=ppt/slides/slide7.xml><?xml version="1.0" encoding="utf-8"?>
+<file path=ppt/slides/slide6.xml><?xml version="1.0" encoding="utf-8"?>
 <p:sld xmlns:a="http://schemas.openxmlformats.org/drawingml/2006/main" xmlns:r="http://schemas.openxmlformats.org/officeDocument/2006/relationships" xmlns:p="http://schemas.openxmlformats.org/presentationml/2006/main">
   <p:cSld>
     <p:spTree>
@@ -14813,7 +14070,7 @@
             </a:pPr>
             <a:fld id="{00000000-1234-1234-1234-123412341234}" type="slidenum">
               <a:rPr lang="en" smtClean="0"/>
-              <a:t>7</a:t>
+              <a:t>6</a:t>
             </a:fld>
             <a:endParaRPr lang="en"/>
           </a:p>
@@ -16193,7 +15450,7 @@
 </p:sld>
 </file>
 
-<file path=ppt/slides/slide8.xml><?xml version="1.0" encoding="utf-8"?>
+<file path=ppt/slides/slide7.xml><?xml version="1.0" encoding="utf-8"?>
 <p:sld xmlns:a="http://schemas.openxmlformats.org/drawingml/2006/main" xmlns:r="http://schemas.openxmlformats.org/officeDocument/2006/relationships" xmlns:p="http://schemas.openxmlformats.org/presentationml/2006/main">
   <p:cSld>
     <p:spTree>
@@ -16320,7 +15577,7 @@
             </a:pPr>
             <a:fld id="{00000000-1234-1234-1234-123412341234}" type="slidenum">
               <a:rPr lang="en"/>
-              <a:t>8</a:t>
+              <a:t>7</a:t>
             </a:fld>
             <a:endParaRPr/>
           </a:p>
@@ -16339,7 +15596,7 @@
 </p:sld>
 </file>
 
-<file path=ppt/slides/slide9.xml><?xml version="1.0" encoding="utf-8"?>
+<file path=ppt/slides/slide8.xml><?xml version="1.0" encoding="utf-8"?>
 <p:sld xmlns:a="http://schemas.openxmlformats.org/drawingml/2006/main" xmlns:r="http://schemas.openxmlformats.org/officeDocument/2006/relationships" xmlns:p="http://schemas.openxmlformats.org/presentationml/2006/main">
   <p:cSld>
     <p:spTree>
@@ -16509,7 +15766,7 @@
             </a:pPr>
             <a:fld id="{00000000-1234-1234-1234-123412341234}" type="slidenum">
               <a:rPr lang="en" smtClean="0"/>
-              <a:t>9</a:t>
+              <a:t>8</a:t>
             </a:fld>
             <a:endParaRPr lang="en"/>
           </a:p>
@@ -16683,6 +15940,152 @@
     <p:extLst>
       <p:ext uri="{BB962C8B-B14F-4D97-AF65-F5344CB8AC3E}">
         <p14:creationId xmlns:p14="http://schemas.microsoft.com/office/powerpoint/2010/main" val="4256685370"/>
+      </p:ext>
+    </p:extLst>
+  </p:cSld>
+  <p:clrMapOvr>
+    <a:masterClrMapping/>
+  </p:clrMapOvr>
+</p:sld>
+</file>
+
+<file path=ppt/slides/slide9.xml><?xml version="1.0" encoding="utf-8"?>
+<p:sld xmlns:a="http://schemas.openxmlformats.org/drawingml/2006/main" xmlns:r="http://schemas.openxmlformats.org/officeDocument/2006/relationships" xmlns:p="http://schemas.openxmlformats.org/presentationml/2006/main">
+  <p:cSld>
+    <p:spTree>
+      <p:nvGrpSpPr>
+        <p:cNvPr id="1" name="Shape 146"/>
+        <p:cNvGrpSpPr/>
+        <p:nvPr/>
+      </p:nvGrpSpPr>
+      <p:grpSpPr>
+        <a:xfrm>
+          <a:off x="0" y="0"/>
+          <a:ext cx="0" cy="0"/>
+          <a:chOff x="0" y="0"/>
+          <a:chExt cx="0" cy="0"/>
+        </a:xfrm>
+      </p:grpSpPr>
+      <p:sp>
+        <p:nvSpPr>
+          <p:cNvPr id="147" name="Google Shape;147;p25"/>
+          <p:cNvSpPr txBox="1">
+            <a:spLocks noGrp="1"/>
+          </p:cNvSpPr>
+          <p:nvPr>
+            <p:ph type="title"/>
+          </p:nvPr>
+        </p:nvSpPr>
+        <p:spPr>
+          <a:xfrm>
+            <a:off x="705000" y="2516825"/>
+            <a:ext cx="8520600" cy="572700"/>
+          </a:xfrm>
+          <a:prstGeom prst="rect">
+            <a:avLst/>
+          </a:prstGeom>
+        </p:spPr>
+        <p:txBody>
+          <a:bodyPr spcFirstLastPara="1" wrap="square" lIns="91400" tIns="91400" rIns="91400" bIns="91400" anchor="b" anchorCtr="0">
+            <a:noAutofit/>
+          </a:bodyPr>
+          <a:lstStyle/>
+          <a:p>
+            <a:pPr marL="0" lvl="0" indent="0" algn="l" rtl="0">
+              <a:spcBef>
+                <a:spcPts val="0"/>
+              </a:spcBef>
+              <a:spcAft>
+                <a:spcPts val="0"/>
+              </a:spcAft>
+              <a:buNone/>
+            </a:pPr>
+            <a:r>
+              <a:rPr lang="en-US" sz="2800" dirty="0">
+                <a:solidFill>
+                  <a:srgbClr val="00DFFF"/>
+                </a:solidFill>
+              </a:rPr>
+              <a:t>Patterns &amp; Practices</a:t>
+            </a:r>
+            <a:endParaRPr sz="2800" dirty="0">
+              <a:solidFill>
+                <a:srgbClr val="00DFFF"/>
+              </a:solidFill>
+            </a:endParaRPr>
+          </a:p>
+          <a:p>
+            <a:pPr marL="0" lvl="0" indent="0" algn="l" rtl="0">
+              <a:spcBef>
+                <a:spcPts val="0"/>
+              </a:spcBef>
+              <a:spcAft>
+                <a:spcPts val="0"/>
+              </a:spcAft>
+              <a:buNone/>
+            </a:pPr>
+            <a:r>
+              <a:rPr lang="en" sz="3200" dirty="0">
+                <a:solidFill>
+                  <a:schemeClr val="lt1"/>
+                </a:solidFill>
+              </a:rPr>
+              <a:t>Higher Order Components</a:t>
+            </a:r>
+            <a:endParaRPr sz="3200" dirty="0">
+              <a:solidFill>
+                <a:schemeClr val="lt1"/>
+              </a:solidFill>
+            </a:endParaRPr>
+          </a:p>
+        </p:txBody>
+      </p:sp>
+      <p:sp>
+        <p:nvSpPr>
+          <p:cNvPr id="149" name="Google Shape;149;p25"/>
+          <p:cNvSpPr txBox="1">
+            <a:spLocks noGrp="1"/>
+          </p:cNvSpPr>
+          <p:nvPr>
+            <p:ph type="sldNum" idx="12"/>
+          </p:nvPr>
+        </p:nvSpPr>
+        <p:spPr>
+          <a:xfrm>
+            <a:off x="8556784" y="4749851"/>
+            <a:ext cx="548700" cy="393600"/>
+          </a:xfrm>
+          <a:prstGeom prst="rect">
+            <a:avLst/>
+          </a:prstGeom>
+        </p:spPr>
+        <p:txBody>
+          <a:bodyPr spcFirstLastPara="1" wrap="square" lIns="91425" tIns="91425" rIns="91425" bIns="91425" anchor="t" anchorCtr="0">
+            <a:noAutofit/>
+          </a:bodyPr>
+          <a:lstStyle/>
+          <a:p>
+            <a:pPr marL="0" lvl="0" indent="0" algn="r" rtl="0">
+              <a:spcBef>
+                <a:spcPts val="0"/>
+              </a:spcBef>
+              <a:spcAft>
+                <a:spcPts val="0"/>
+              </a:spcAft>
+              <a:buNone/>
+            </a:pPr>
+            <a:fld id="{00000000-1234-1234-1234-123412341234}" type="slidenum">
+              <a:rPr lang="en"/>
+              <a:t>9</a:t>
+            </a:fld>
+            <a:endParaRPr/>
+          </a:p>
+        </p:txBody>
+      </p:sp>
+    </p:spTree>
+    <p:extLst>
+      <p:ext uri="{BB962C8B-B14F-4D97-AF65-F5344CB8AC3E}">
+        <p14:creationId xmlns:p14="http://schemas.microsoft.com/office/powerpoint/2010/main" val="2419170171"/>
       </p:ext>
     </p:extLst>
   </p:cSld>

</xml_diff>